<commit_message>
vault backup: 2025-05-05 22:38:38
</commit_message>
<xml_diff>
--- a/科研记录/TabPFN报告.pptx
+++ b/科研记录/TabPFN报告.pptx
@@ -21846,19 +21846,7 @@
             </a:r>
             <a:r>
               <a:rPr lang="zh-CN" altLang="en-US"/>
-              <a:t>模型进行评估</a:t>
-            </a:r>
-            <a:r>
-              <a:rPr lang="en-US" altLang="zh-CN"/>
-              <a:t>, </a:t>
-            </a:r>
-            <a:r>
-              <a:rPr lang="zh-CN" altLang="en-US"/>
-              <a:t>将它们的预测结果加权平均</a:t>
-            </a:r>
-            <a:r>
-              <a:rPr lang="en-US" altLang="zh-CN"/>
-              <a:t>.</a:t>
+              <a:t>模型进行评估，将它们的预测结果加权平均。</a:t>
             </a:r>
             <a:endParaRPr lang="en-US" altLang="zh-CN"/>
           </a:p>
@@ -21887,27 +21875,11 @@
           <a:p>
             <a:r>
               <a:rPr lang="zh-CN" altLang="en-US"/>
-              <a:t>模型并不是完全置换不变的</a:t>
-            </a:r>
-            <a:r>
-              <a:rPr lang="en-US" altLang="zh-CN"/>
-              <a:t>, </a:t>
+              <a:t>模型并不是完全置换不变的，因此通过对特征顺序以及分类任务的标签顺序进行洗牌，</a:t>
             </a:r>
             <a:r>
               <a:rPr lang="zh-CN" altLang="en-US"/>
-              <a:t>因此通过对特征顺序以及分类任务的标签顺序进行洗牌</a:t>
-            </a:r>
-            <a:r>
-              <a:rPr lang="en-US" altLang="zh-CN"/>
-              <a:t>, </a:t>
-            </a:r>
-            <a:r>
-              <a:rPr lang="zh-CN" altLang="en-US"/>
-              <a:t>来近似置换不变性</a:t>
-            </a:r>
-            <a:r>
-              <a:rPr lang="en-US" altLang="zh-CN"/>
-              <a:t>.</a:t>
+              <a:t>来近似置换不变性。</a:t>
             </a:r>
             <a:endParaRPr lang="en-US" altLang="zh-CN"/>
           </a:p>
@@ -21921,7 +21893,7 @@
         </p:nvSpPr>
         <p:spPr>
           <a:xfrm>
-            <a:off x="5245735" y="4707255"/>
+            <a:off x="7493000" y="4767580"/>
             <a:ext cx="1700530" cy="368300"/>
           </a:xfrm>
           <a:prstGeom prst="rect">
@@ -21939,6 +21911,39 @@
               <a:t>and so on ...</a:t>
             </a:r>
             <a:endParaRPr lang="en-US" altLang="zh-CN"/>
+          </a:p>
+        </p:txBody>
+      </p:sp>
+      <p:sp>
+        <p:nvSpPr>
+          <p:cNvPr id="2" name="文本框 1"/>
+          <p:cNvSpPr txBox="1"/>
+          <p:nvPr/>
+        </p:nvSpPr>
+        <p:spPr>
+          <a:xfrm>
+            <a:off x="1296670" y="4629150"/>
+            <a:ext cx="4064000" cy="645160"/>
+          </a:xfrm>
+          <a:prstGeom prst="rect">
+            <a:avLst/>
+          </a:prstGeom>
+          <a:noFill/>
+        </p:spPr>
+        <p:txBody>
+          <a:bodyPr wrap="square" rtlCol="0">
+            <a:spAutoFit/>
+          </a:bodyPr>
+          <a:p>
+            <a:r>
+              <a:rPr lang="zh-CN" altLang="en-US"/>
+              <a:t>采样后还要对样本进行线性组合，以构建更复杂的非独立</a:t>
+            </a:r>
+            <a:r>
+              <a:rPr lang="zh-CN" altLang="en-US"/>
+              <a:t>性。</a:t>
+            </a:r>
+            <a:endParaRPr lang="zh-CN" altLang="en-US"/>
           </a:p>
         </p:txBody>
       </p:sp>

</xml_diff>